<commit_message>
node2vec homo and str eq
</commit_message>
<xml_diff>
--- a/2_node2vec/node2vec.pptx
+++ b/2_node2vec/node2vec.pptx
@@ -5,12 +5,13 @@
     <p:sldMasterId id="2147483684" r:id="rId1"/>
   </p:sldMasterIdLst>
   <p:notesMasterIdLst>
-    <p:notesMasterId r:id="rId5"/>
+    <p:notesMasterId r:id="rId6"/>
   </p:notesMasterIdLst>
   <p:sldIdLst>
     <p:sldId id="256" r:id="rId2"/>
     <p:sldId id="258" r:id="rId3"/>
     <p:sldId id="257" r:id="rId4"/>
+    <p:sldId id="259" r:id="rId5"/>
   </p:sldIdLst>
   <p:sldSz cx="12192000" cy="9144000"/>
   <p:notesSz cx="6858000" cy="9144000"/>
@@ -199,7 +200,7 @@
           <a:p>
             <a:fld id="{62B517B9-F9DA-4CE7-8A0F-16C8C2F77E8F}" type="datetimeFigureOut">
               <a:rPr lang="zh-CN" altLang="en-US" smtClean="0"/>
-              <a:t>2021/9/26</a:t>
+              <a:t>2021/9/27</a:t>
             </a:fld>
             <a:endParaRPr lang="zh-CN" altLang="en-US"/>
           </a:p>
@@ -781,6 +782,170 @@
 </p:notes>
 </file>
 
+<file path=ppt/notesSlides/notesSlide4.xml><?xml version="1.0" encoding="utf-8"?>
+<p:notes xmlns:a="http://schemas.openxmlformats.org/drawingml/2006/main" xmlns:r="http://schemas.openxmlformats.org/officeDocument/2006/relationships" xmlns:p="http://schemas.openxmlformats.org/presentationml/2006/main">
+  <p:cSld>
+    <p:spTree>
+      <p:nvGrpSpPr>
+        <p:cNvPr id="1" name=""/>
+        <p:cNvGrpSpPr/>
+        <p:nvPr/>
+      </p:nvGrpSpPr>
+      <p:grpSpPr>
+        <a:xfrm>
+          <a:off x="0" y="0"/>
+          <a:ext cx="0" cy="0"/>
+          <a:chOff x="0" y="0"/>
+          <a:chExt cx="0" cy="0"/>
+        </a:xfrm>
+      </p:grpSpPr>
+      <p:sp>
+        <p:nvSpPr>
+          <p:cNvPr id="2" name="幻灯片图像占位符 1"/>
+          <p:cNvSpPr>
+            <a:spLocks noGrp="1" noRot="1" noChangeAspect="1"/>
+          </p:cNvSpPr>
+          <p:nvPr>
+            <p:ph type="sldImg"/>
+          </p:nvPr>
+        </p:nvSpPr>
+        <p:spPr/>
+      </p:sp>
+      <p:sp>
+        <p:nvSpPr>
+          <p:cNvPr id="3" name="备注占位符 2"/>
+          <p:cNvSpPr>
+            <a:spLocks noGrp="1"/>
+          </p:cNvSpPr>
+          <p:nvPr>
+            <p:ph type="body" idx="1"/>
+          </p:nvPr>
+        </p:nvSpPr>
+        <p:spPr/>
+        <p:txBody>
+          <a:bodyPr/>
+          <a:lstStyle/>
+          <a:p>
+            <a:r>
+              <a:rPr lang="en-US" altLang="zh-CN" dirty="0"/>
+              <a:t>p</a:t>
+            </a:r>
+            <a:r>
+              <a:rPr lang="zh-CN" altLang="en-US" dirty="0"/>
+              <a:t>比较大，在下面两步取样到已经访问结点的可能性变低，这将会有一个适中的探索以及避免取样中的</a:t>
+            </a:r>
+            <a:r>
+              <a:rPr lang="en-US" altLang="zh-CN" dirty="0"/>
+              <a:t>2-hop</a:t>
+            </a:r>
+            <a:r>
+              <a:rPr lang="zh-CN" altLang="en-US" dirty="0"/>
+              <a:t>多余性。</a:t>
+            </a:r>
+            <a:endParaRPr lang="en-US" altLang="zh-CN" dirty="0"/>
+          </a:p>
+          <a:p>
+            <a:r>
+              <a:rPr lang="en-US" altLang="zh-CN" dirty="0"/>
+              <a:t>P</a:t>
+            </a:r>
+            <a:r>
+              <a:rPr lang="zh-CN" altLang="en-US" dirty="0"/>
+              <a:t>比较小，随机游走可能会返回一步，这将会保持随机游走在源点</a:t>
+            </a:r>
+            <a:r>
+              <a:rPr lang="en-US" altLang="zh-CN" dirty="0"/>
+              <a:t>u</a:t>
+            </a:r>
+            <a:r>
+              <a:rPr lang="zh-CN" altLang="en-US" dirty="0"/>
+              <a:t>的附近。</a:t>
+            </a:r>
+            <a:endParaRPr lang="en-US" altLang="zh-CN" dirty="0"/>
+          </a:p>
+          <a:p>
+            <a:r>
+              <a:rPr lang="en-US" altLang="zh-CN" dirty="0"/>
+              <a:t>q&gt;1</a:t>
+            </a:r>
+            <a:r>
+              <a:rPr lang="zh-CN" altLang="en-US" dirty="0"/>
+              <a:t>，随机游走偏向访问距离</a:t>
+            </a:r>
+            <a:r>
+              <a:rPr lang="en-US" altLang="zh-CN" dirty="0"/>
+              <a:t>t</a:t>
+            </a:r>
+            <a:r>
+              <a:rPr lang="zh-CN" altLang="en-US" dirty="0"/>
+              <a:t>近的点，更偏向</a:t>
+            </a:r>
+            <a:r>
+              <a:rPr lang="en-US" altLang="zh-CN" dirty="0"/>
+              <a:t>BFS</a:t>
+            </a:r>
+          </a:p>
+          <a:p>
+            <a:r>
+              <a:rPr lang="en-US" altLang="zh-CN" dirty="0"/>
+              <a:t>q&lt;1</a:t>
+            </a:r>
+            <a:r>
+              <a:rPr lang="zh-CN" altLang="en-US" dirty="0"/>
+              <a:t>，随机游走偏向访问距离</a:t>
+            </a:r>
+            <a:r>
+              <a:rPr lang="en-US" altLang="zh-CN" dirty="0"/>
+              <a:t>t</a:t>
+            </a:r>
+            <a:r>
+              <a:rPr lang="zh-CN" altLang="en-US" dirty="0"/>
+              <a:t>远的点，更偏向</a:t>
+            </a:r>
+            <a:r>
+              <a:rPr lang="en-US" altLang="zh-CN" dirty="0"/>
+              <a:t>DFS</a:t>
+            </a:r>
+            <a:endParaRPr lang="zh-CN" altLang="en-US" dirty="0"/>
+          </a:p>
+        </p:txBody>
+      </p:sp>
+      <p:sp>
+        <p:nvSpPr>
+          <p:cNvPr id="4" name="灯片编号占位符 3"/>
+          <p:cNvSpPr>
+            <a:spLocks noGrp="1"/>
+          </p:cNvSpPr>
+          <p:nvPr>
+            <p:ph type="sldNum" sz="quarter" idx="5"/>
+          </p:nvPr>
+        </p:nvSpPr>
+        <p:spPr/>
+        <p:txBody>
+          <a:bodyPr/>
+          <a:lstStyle/>
+          <a:p>
+            <a:fld id="{F0BEF969-9955-4A7A-886D-0A6DC0CB3B66}" type="slidenum">
+              <a:rPr lang="zh-CN" altLang="en-US" smtClean="0"/>
+              <a:t>4</a:t>
+            </a:fld>
+            <a:endParaRPr lang="zh-CN" altLang="en-US"/>
+          </a:p>
+        </p:txBody>
+      </p:sp>
+    </p:spTree>
+    <p:extLst>
+      <p:ext uri="{BB962C8B-B14F-4D97-AF65-F5344CB8AC3E}">
+        <p14:creationId xmlns:p14="http://schemas.microsoft.com/office/powerpoint/2010/main" val="3645057917"/>
+      </p:ext>
+    </p:extLst>
+  </p:cSld>
+  <p:clrMapOvr>
+    <a:masterClrMapping/>
+  </p:clrMapOvr>
+</p:notes>
+</file>
+
 <file path=ppt/slideLayouts/slideLayout1.xml><?xml version="1.0" encoding="utf-8"?>
 <p:sldLayout xmlns:a="http://schemas.openxmlformats.org/drawingml/2006/main" xmlns:r="http://schemas.openxmlformats.org/officeDocument/2006/relationships" xmlns:p="http://schemas.openxmlformats.org/presentationml/2006/main" type="title" preserve="1">
   <p:cSld name="标题幻灯片">
@@ -912,7 +1077,7 @@
           <a:p>
             <a:fld id="{7AC5E4EC-F5B6-4692-B35B-92C4C1A65EF4}" type="datetimeFigureOut">
               <a:rPr lang="zh-CN" altLang="en-US" smtClean="0"/>
-              <a:t>2021/9/26</a:t>
+              <a:t>2021/9/27</a:t>
             </a:fld>
             <a:endParaRPr lang="zh-CN" altLang="en-US"/>
           </a:p>
@@ -1082,7 +1247,7 @@
           <a:p>
             <a:fld id="{7AC5E4EC-F5B6-4692-B35B-92C4C1A65EF4}" type="datetimeFigureOut">
               <a:rPr lang="zh-CN" altLang="en-US" smtClean="0"/>
-              <a:t>2021/9/26</a:t>
+              <a:t>2021/9/27</a:t>
             </a:fld>
             <a:endParaRPr lang="zh-CN" altLang="en-US"/>
           </a:p>
@@ -1262,7 +1427,7 @@
           <a:p>
             <a:fld id="{7AC5E4EC-F5B6-4692-B35B-92C4C1A65EF4}" type="datetimeFigureOut">
               <a:rPr lang="zh-CN" altLang="en-US" smtClean="0"/>
-              <a:t>2021/9/26</a:t>
+              <a:t>2021/9/27</a:t>
             </a:fld>
             <a:endParaRPr lang="zh-CN" altLang="en-US"/>
           </a:p>
@@ -1432,7 +1597,7 @@
           <a:p>
             <a:fld id="{7AC5E4EC-F5B6-4692-B35B-92C4C1A65EF4}" type="datetimeFigureOut">
               <a:rPr lang="zh-CN" altLang="en-US" smtClean="0"/>
-              <a:t>2021/9/26</a:t>
+              <a:t>2021/9/27</a:t>
             </a:fld>
             <a:endParaRPr lang="zh-CN" altLang="en-US"/>
           </a:p>
@@ -1676,7 +1841,7 @@
           <a:p>
             <a:fld id="{7AC5E4EC-F5B6-4692-B35B-92C4C1A65EF4}" type="datetimeFigureOut">
               <a:rPr lang="zh-CN" altLang="en-US" smtClean="0"/>
-              <a:t>2021/9/26</a:t>
+              <a:t>2021/9/27</a:t>
             </a:fld>
             <a:endParaRPr lang="zh-CN" altLang="en-US"/>
           </a:p>
@@ -1908,7 +2073,7 @@
           <a:p>
             <a:fld id="{7AC5E4EC-F5B6-4692-B35B-92C4C1A65EF4}" type="datetimeFigureOut">
               <a:rPr lang="zh-CN" altLang="en-US" smtClean="0"/>
-              <a:t>2021/9/26</a:t>
+              <a:t>2021/9/27</a:t>
             </a:fld>
             <a:endParaRPr lang="zh-CN" altLang="en-US"/>
           </a:p>
@@ -2275,7 +2440,7 @@
           <a:p>
             <a:fld id="{7AC5E4EC-F5B6-4692-B35B-92C4C1A65EF4}" type="datetimeFigureOut">
               <a:rPr lang="zh-CN" altLang="en-US" smtClean="0"/>
-              <a:t>2021/9/26</a:t>
+              <a:t>2021/9/27</a:t>
             </a:fld>
             <a:endParaRPr lang="zh-CN" altLang="en-US"/>
           </a:p>
@@ -2393,7 +2558,7 @@
           <a:p>
             <a:fld id="{7AC5E4EC-F5B6-4692-B35B-92C4C1A65EF4}" type="datetimeFigureOut">
               <a:rPr lang="zh-CN" altLang="en-US" smtClean="0"/>
-              <a:t>2021/9/26</a:t>
+              <a:t>2021/9/27</a:t>
             </a:fld>
             <a:endParaRPr lang="zh-CN" altLang="en-US"/>
           </a:p>
@@ -2488,7 +2653,7 @@
           <a:p>
             <a:fld id="{7AC5E4EC-F5B6-4692-B35B-92C4C1A65EF4}" type="datetimeFigureOut">
               <a:rPr lang="zh-CN" altLang="en-US" smtClean="0"/>
-              <a:t>2021/9/26</a:t>
+              <a:t>2021/9/27</a:t>
             </a:fld>
             <a:endParaRPr lang="zh-CN" altLang="en-US"/>
           </a:p>
@@ -2765,7 +2930,7 @@
           <a:p>
             <a:fld id="{7AC5E4EC-F5B6-4692-B35B-92C4C1A65EF4}" type="datetimeFigureOut">
               <a:rPr lang="zh-CN" altLang="en-US" smtClean="0"/>
-              <a:t>2021/9/26</a:t>
+              <a:t>2021/9/27</a:t>
             </a:fld>
             <a:endParaRPr lang="zh-CN" altLang="en-US"/>
           </a:p>
@@ -3022,7 +3187,7 @@
           <a:p>
             <a:fld id="{7AC5E4EC-F5B6-4692-B35B-92C4C1A65EF4}" type="datetimeFigureOut">
               <a:rPr lang="zh-CN" altLang="en-US" smtClean="0"/>
-              <a:t>2021/9/26</a:t>
+              <a:t>2021/9/27</a:t>
             </a:fld>
             <a:endParaRPr lang="zh-CN" altLang="en-US"/>
           </a:p>
@@ -3235,7 +3400,7 @@
           <a:p>
             <a:fld id="{7AC5E4EC-F5B6-4692-B35B-92C4C1A65EF4}" type="datetimeFigureOut">
               <a:rPr lang="zh-CN" altLang="en-US" smtClean="0"/>
-              <a:t>2021/9/26</a:t>
+              <a:t>2021/9/27</a:t>
             </a:fld>
             <a:endParaRPr lang="zh-CN" altLang="en-US"/>
           </a:p>
@@ -9932,6 +10097,583 @@
 </p:sld>
 </file>
 
+<file path=ppt/slides/slide4.xml><?xml version="1.0" encoding="utf-8"?>
+<p:sld xmlns:a="http://schemas.openxmlformats.org/drawingml/2006/main" xmlns:r="http://schemas.openxmlformats.org/officeDocument/2006/relationships" xmlns:p="http://schemas.openxmlformats.org/presentationml/2006/main">
+  <p:cSld>
+    <p:spTree>
+      <p:nvGrpSpPr>
+        <p:cNvPr id="1" name=""/>
+        <p:cNvGrpSpPr/>
+        <p:nvPr/>
+      </p:nvGrpSpPr>
+      <p:grpSpPr>
+        <a:xfrm>
+          <a:off x="0" y="0"/>
+          <a:ext cx="0" cy="0"/>
+          <a:chOff x="0" y="0"/>
+          <a:chExt cx="0" cy="0"/>
+        </a:xfrm>
+      </p:grpSpPr>
+      <p:sp>
+        <p:nvSpPr>
+          <p:cNvPr id="4" name="矩形 3">
+            <a:extLst>
+              <a:ext uri="{FF2B5EF4-FFF2-40B4-BE49-F238E27FC236}">
+                <a16:creationId xmlns:a16="http://schemas.microsoft.com/office/drawing/2014/main" id="{B916122D-6A2E-4753-B550-668ABAACE4E4}"/>
+              </a:ext>
+            </a:extLst>
+          </p:cNvPr>
+          <p:cNvSpPr/>
+          <p:nvPr/>
+        </p:nvSpPr>
+        <p:spPr>
+          <a:xfrm>
+            <a:off x="1257395" y="8424945"/>
+            <a:ext cx="8743804" cy="369332"/>
+          </a:xfrm>
+          <a:prstGeom prst="rect">
+            <a:avLst/>
+          </a:prstGeom>
+        </p:spPr>
+        <p:txBody>
+          <a:bodyPr wrap="none">
+            <a:spAutoFit/>
+          </a:bodyPr>
+          <a:lstStyle/>
+          <a:p>
+            <a:r>
+              <a:rPr lang="zh-CN" altLang="en-US" dirty="0">
+                <a:latin typeface="微软雅黑" panose="020B0503020204020204" pitchFamily="34" charset="-122"/>
+                <a:ea typeface="微软雅黑" panose="020B0503020204020204" pitchFamily="34" charset="-122"/>
+              </a:rPr>
+              <a:t>参考链接：</a:t>
+            </a:r>
+            <a:r>
+              <a:rPr lang="en-US" altLang="zh-CN" dirty="0">
+                <a:hlinkClick r:id="rId3"/>
+              </a:rPr>
+              <a:t>【Graph Embedding】node2vec</a:t>
+            </a:r>
+            <a:r>
+              <a:rPr lang="zh-CN" altLang="en-US" dirty="0">
+                <a:hlinkClick r:id="rId3"/>
+              </a:rPr>
+              <a:t>：算法原理，实现和应用 </a:t>
+            </a:r>
+            <a:r>
+              <a:rPr lang="en-US" altLang="zh-CN" dirty="0">
+                <a:hlinkClick r:id="rId3"/>
+              </a:rPr>
+              <a:t>- </a:t>
+            </a:r>
+            <a:r>
+              <a:rPr lang="zh-CN" altLang="en-US" dirty="0">
+                <a:hlinkClick r:id="rId3"/>
+              </a:rPr>
+              <a:t>知乎 </a:t>
+            </a:r>
+            <a:r>
+              <a:rPr lang="en-US" altLang="zh-CN" dirty="0">
+                <a:hlinkClick r:id="rId3"/>
+              </a:rPr>
+              <a:t>(zhihu.com)</a:t>
+            </a:r>
+            <a:endParaRPr lang="zh-CN" altLang="en-US" dirty="0">
+              <a:latin typeface="微软雅黑" panose="020B0503020204020204" pitchFamily="34" charset="-122"/>
+              <a:ea typeface="微软雅黑" panose="020B0503020204020204" pitchFamily="34" charset="-122"/>
+            </a:endParaRPr>
+          </a:p>
+        </p:txBody>
+      </p:sp>
+      <p:pic>
+        <p:nvPicPr>
+          <p:cNvPr id="5" name="图片 4">
+            <a:extLst>
+              <a:ext uri="{FF2B5EF4-FFF2-40B4-BE49-F238E27FC236}">
+                <a16:creationId xmlns:a16="http://schemas.microsoft.com/office/drawing/2014/main" id="{676E50B5-3C74-4734-B154-41C14BE2906D}"/>
+              </a:ext>
+            </a:extLst>
+          </p:cNvPr>
+          <p:cNvPicPr>
+            <a:picLocks noChangeAspect="1"/>
+          </p:cNvPicPr>
+          <p:nvPr/>
+        </p:nvPicPr>
+        <p:blipFill>
+          <a:blip r:embed="rId4"/>
+          <a:stretch>
+            <a:fillRect/>
+          </a:stretch>
+        </p:blipFill>
+        <p:spPr>
+          <a:xfrm>
+            <a:off x="8968672" y="2545300"/>
+            <a:ext cx="2563597" cy="1828908"/>
+          </a:xfrm>
+          <a:prstGeom prst="rect">
+            <a:avLst/>
+          </a:prstGeom>
+        </p:spPr>
+      </p:pic>
+      <mc:AlternateContent xmlns:mc="http://schemas.openxmlformats.org/markup-compatibility/2006">
+        <mc:Choice xmlns:a14="http://schemas.microsoft.com/office/drawing/2010/main" Requires="a14">
+          <p:sp>
+            <p:nvSpPr>
+              <p:cNvPr id="7" name="矩形 6">
+                <a:extLst>
+                  <a:ext uri="{FF2B5EF4-FFF2-40B4-BE49-F238E27FC236}">
+                    <a16:creationId xmlns:a16="http://schemas.microsoft.com/office/drawing/2014/main" id="{5ADE71BA-50FE-47DA-93BD-C3EECAD4A5C1}"/>
+                  </a:ext>
+                </a:extLst>
+              </p:cNvPr>
+              <p:cNvSpPr/>
+              <p:nvPr/>
+            </p:nvSpPr>
+            <p:spPr>
+              <a:xfrm>
+                <a:off x="135753" y="443017"/>
+                <a:ext cx="11848550" cy="3046988"/>
+              </a:xfrm>
+              <a:prstGeom prst="rect">
+                <a:avLst/>
+              </a:prstGeom>
+            </p:spPr>
+            <p:txBody>
+              <a:bodyPr wrap="square">
+                <a:spAutoFit/>
+              </a:bodyPr>
+              <a:lstStyle/>
+              <a:p>
+                <a:pPr marL="342900" indent="-342900">
+                  <a:buFont typeface="Arial" panose="020B0604020202020204" pitchFamily="34" charset="0"/>
+                  <a:buChar char="•"/>
+                </a:pPr>
+                <a:r>
+                  <a:rPr lang="en-US" altLang="zh-CN" sz="2400" b="1" dirty="0">
+                    <a:solidFill>
+                      <a:prstClr val="black"/>
+                    </a:solidFill>
+                  </a:rPr>
+                  <a:t>Return parameter, </a:t>
+                </a:r>
+                <a14:m>
+                  <m:oMath xmlns:m="http://schemas.openxmlformats.org/officeDocument/2006/math">
+                    <m:r>
+                      <a:rPr lang="en-US" altLang="zh-CN" sz="2400" b="0" i="1">
+                        <a:solidFill>
+                          <a:prstClr val="black"/>
+                        </a:solidFill>
+                        <a:latin typeface="Cambria Math" panose="02040503050406030204" pitchFamily="18" charset="0"/>
+                      </a:rPr>
+                      <m:t>𝑝</m:t>
+                    </m:r>
+                  </m:oMath>
+                </a14:m>
+                <a:r>
+                  <a:rPr lang="en-US" altLang="zh-CN" sz="2400" dirty="0">
+                    <a:solidFill>
+                      <a:prstClr val="black"/>
+                    </a:solidFill>
+                  </a:rPr>
+                  <a:t>. Control the likelihood of immediately revisiting a node in the walk.</a:t>
+                </a:r>
+              </a:p>
+              <a:p>
+                <a:r>
+                  <a:rPr lang="en-US" altLang="zh-CN" sz="2400" dirty="0">
+                    <a:solidFill>
+                      <a:prstClr val="black"/>
+                    </a:solidFill>
+                  </a:rPr>
+                  <a:t>	 </a:t>
+                </a:r>
+                <a14:m>
+                  <m:oMath xmlns:m="http://schemas.openxmlformats.org/officeDocument/2006/math">
+                    <m:r>
+                      <a:rPr lang="en-US" altLang="zh-CN" sz="2400" b="0" i="1" smtClean="0">
+                        <a:solidFill>
+                          <a:prstClr val="black"/>
+                        </a:solidFill>
+                        <a:latin typeface="Cambria Math" panose="02040503050406030204" pitchFamily="18" charset="0"/>
+                      </a:rPr>
+                      <m:t>𝑝</m:t>
+                    </m:r>
+                    <m:r>
+                      <a:rPr lang="en-US" altLang="zh-CN" sz="2400" b="0" i="1" smtClean="0">
+                        <a:solidFill>
+                          <a:prstClr val="black"/>
+                        </a:solidFill>
+                        <a:latin typeface="Cambria Math" panose="02040503050406030204" pitchFamily="18" charset="0"/>
+                      </a:rPr>
+                      <m:t>&gt;</m:t>
+                    </m:r>
+                    <m:r>
+                      <m:rPr>
+                        <m:sty m:val="p"/>
+                      </m:rPr>
+                      <a:rPr lang="en-US" altLang="zh-CN" sz="2400" b="0" i="0" smtClean="0">
+                        <a:solidFill>
+                          <a:prstClr val="black"/>
+                        </a:solidFill>
+                        <a:latin typeface="Cambria Math" panose="02040503050406030204" pitchFamily="18" charset="0"/>
+                      </a:rPr>
+                      <m:t>max</m:t>
+                    </m:r>
+                    <m:r>
+                      <a:rPr lang="en-US" altLang="zh-CN" sz="2400" b="0" i="1" smtClean="0">
+                        <a:solidFill>
+                          <a:prstClr val="black"/>
+                        </a:solidFill>
+                        <a:latin typeface="Cambria Math" panose="02040503050406030204" pitchFamily="18" charset="0"/>
+                      </a:rPr>
+                      <m:t>⁡(</m:t>
+                    </m:r>
+                    <m:r>
+                      <a:rPr lang="en-US" altLang="zh-CN" sz="2400" b="0" i="1" smtClean="0">
+                        <a:solidFill>
+                          <a:prstClr val="black"/>
+                        </a:solidFill>
+                        <a:latin typeface="Cambria Math" panose="02040503050406030204" pitchFamily="18" charset="0"/>
+                      </a:rPr>
+                      <m:t>𝑞</m:t>
+                    </m:r>
+                    <m:r>
+                      <a:rPr lang="en-US" altLang="zh-CN" sz="2400" b="0" i="1" smtClean="0">
+                        <a:solidFill>
+                          <a:prstClr val="black"/>
+                        </a:solidFill>
+                        <a:latin typeface="Cambria Math" panose="02040503050406030204" pitchFamily="18" charset="0"/>
+                      </a:rPr>
+                      <m:t>,1)</m:t>
+                    </m:r>
+                  </m:oMath>
+                </a14:m>
+                <a:r>
+                  <a:rPr lang="en-US" altLang="zh-CN" sz="2400" dirty="0">
+                    <a:solidFill>
+                      <a:prstClr val="black"/>
+                    </a:solidFill>
+                  </a:rPr>
+                  <a:t>, less likely sample visited node.</a:t>
+                </a:r>
+              </a:p>
+              <a:p>
+                <a:r>
+                  <a:rPr lang="en-US" altLang="zh-CN" sz="2400" dirty="0">
+                    <a:solidFill>
+                      <a:prstClr val="black"/>
+                    </a:solidFill>
+                  </a:rPr>
+                  <a:t>	 </a:t>
+                </a:r>
+                <a14:m>
+                  <m:oMath xmlns:m="http://schemas.openxmlformats.org/officeDocument/2006/math">
+                    <m:r>
+                      <a:rPr lang="en-US" altLang="zh-CN" sz="2400" i="1">
+                        <a:solidFill>
+                          <a:prstClr val="black"/>
+                        </a:solidFill>
+                        <a:latin typeface="Cambria Math" panose="02040503050406030204" pitchFamily="18" charset="0"/>
+                      </a:rPr>
+                      <m:t>𝑝</m:t>
+                    </m:r>
+                    <m:r>
+                      <a:rPr lang="en-US" altLang="zh-CN" sz="2400" b="0" i="1" smtClean="0">
+                        <a:solidFill>
+                          <a:prstClr val="black"/>
+                        </a:solidFill>
+                        <a:latin typeface="Cambria Math" panose="02040503050406030204" pitchFamily="18" charset="0"/>
+                      </a:rPr>
+                      <m:t>&lt;</m:t>
+                    </m:r>
+                    <m:func>
+                      <m:funcPr>
+                        <m:ctrlPr>
+                          <a:rPr lang="en-US" altLang="zh-CN" sz="2400" b="0" i="1" smtClean="0">
+                            <a:solidFill>
+                              <a:prstClr val="black"/>
+                            </a:solidFill>
+                            <a:latin typeface="Cambria Math" panose="02040503050406030204" pitchFamily="18" charset="0"/>
+                          </a:rPr>
+                        </m:ctrlPr>
+                      </m:funcPr>
+                      <m:fName>
+                        <m:r>
+                          <m:rPr>
+                            <m:sty m:val="p"/>
+                          </m:rPr>
+                          <a:rPr lang="en-US" altLang="zh-CN" sz="2400" b="0" i="0" smtClean="0">
+                            <a:solidFill>
+                              <a:prstClr val="black"/>
+                            </a:solidFill>
+                            <a:latin typeface="Cambria Math" panose="02040503050406030204" pitchFamily="18" charset="0"/>
+                          </a:rPr>
+                          <m:t>max</m:t>
+                        </m:r>
+                      </m:fName>
+                      <m:e>
+                        <m:d>
+                          <m:dPr>
+                            <m:ctrlPr>
+                              <a:rPr lang="en-US" altLang="zh-CN" sz="2400" b="0" i="1" smtClean="0">
+                                <a:solidFill>
+                                  <a:prstClr val="black"/>
+                                </a:solidFill>
+                                <a:latin typeface="Cambria Math" panose="02040503050406030204" pitchFamily="18" charset="0"/>
+                              </a:rPr>
+                            </m:ctrlPr>
+                          </m:dPr>
+                          <m:e>
+                            <m:r>
+                              <a:rPr lang="en-US" altLang="zh-CN" sz="2400" b="0" i="1" smtClean="0">
+                                <a:solidFill>
+                                  <a:prstClr val="black"/>
+                                </a:solidFill>
+                                <a:latin typeface="Cambria Math" panose="02040503050406030204" pitchFamily="18" charset="0"/>
+                              </a:rPr>
+                              <m:t>𝑞</m:t>
+                            </m:r>
+                            <m:r>
+                              <a:rPr lang="en-US" altLang="zh-CN" sz="2400" b="0" i="1" smtClean="0">
+                                <a:solidFill>
+                                  <a:prstClr val="black"/>
+                                </a:solidFill>
+                                <a:latin typeface="Cambria Math" panose="02040503050406030204" pitchFamily="18" charset="0"/>
+                              </a:rPr>
+                              <m:t>,1</m:t>
+                            </m:r>
+                          </m:e>
+                        </m:d>
+                      </m:e>
+                    </m:func>
+                  </m:oMath>
+                </a14:m>
+                <a:r>
+                  <a:rPr lang="en-US" altLang="zh-CN" sz="2400" dirty="0">
+                    <a:solidFill>
+                      <a:prstClr val="black"/>
+                    </a:solidFill>
+                  </a:rPr>
+                  <a:t>, lead the walk to backtrack a step.</a:t>
+                </a:r>
+              </a:p>
+              <a:p>
+                <a:endParaRPr lang="en-US" altLang="zh-CN" sz="2400" dirty="0">
+                  <a:solidFill>
+                    <a:prstClr val="black"/>
+                  </a:solidFill>
+                </a:endParaRPr>
+              </a:p>
+              <a:p>
+                <a:pPr marL="342900" indent="-342900">
+                  <a:buFont typeface="Arial" panose="020B0604020202020204" pitchFamily="34" charset="0"/>
+                  <a:buChar char="•"/>
+                </a:pPr>
+                <a:r>
+                  <a:rPr lang="en-US" altLang="zh-CN" sz="2400" b="1" dirty="0">
+                    <a:solidFill>
+                      <a:prstClr val="black"/>
+                    </a:solidFill>
+                  </a:rPr>
+                  <a:t>In-out parameter, </a:t>
+                </a:r>
+                <a14:m>
+                  <m:oMath xmlns:m="http://schemas.openxmlformats.org/officeDocument/2006/math">
+                    <m:r>
+                      <a:rPr lang="en-US" altLang="zh-CN" sz="2400" b="0" i="1" smtClean="0">
+                        <a:solidFill>
+                          <a:prstClr val="black"/>
+                        </a:solidFill>
+                        <a:latin typeface="Cambria Math" panose="02040503050406030204" pitchFamily="18" charset="0"/>
+                      </a:rPr>
+                      <m:t>𝑞</m:t>
+                    </m:r>
+                  </m:oMath>
+                </a14:m>
+                <a:r>
+                  <a:rPr lang="en-US" altLang="zh-CN" sz="2400" dirty="0">
+                    <a:solidFill>
+                      <a:prstClr val="black"/>
+                    </a:solidFill>
+                  </a:rPr>
+                  <a:t>. Allows the search to differentiate between “inward” and “outward” nodes.</a:t>
+                </a:r>
+              </a:p>
+              <a:p>
+                <a:pPr lvl="1"/>
+                <a14:m>
+                  <m:oMath xmlns:m="http://schemas.openxmlformats.org/officeDocument/2006/math">
+                    <m:r>
+                      <a:rPr lang="en-US" altLang="zh-CN" sz="2400" i="1">
+                        <a:solidFill>
+                          <a:prstClr val="black"/>
+                        </a:solidFill>
+                        <a:latin typeface="Cambria Math" panose="02040503050406030204" pitchFamily="18" charset="0"/>
+                      </a:rPr>
+                      <m:t>𝑞</m:t>
+                    </m:r>
+                    <m:r>
+                      <a:rPr lang="en-US" altLang="zh-CN" sz="2400" b="0" i="1" smtClean="0">
+                        <a:solidFill>
+                          <a:prstClr val="black"/>
+                        </a:solidFill>
+                        <a:latin typeface="Cambria Math" panose="02040503050406030204" pitchFamily="18" charset="0"/>
+                      </a:rPr>
+                      <m:t>&gt;1</m:t>
+                    </m:r>
+                  </m:oMath>
+                </a14:m>
+                <a:r>
+                  <a:rPr lang="en-US" altLang="zh-CN" sz="2400" dirty="0">
+                    <a:solidFill>
+                      <a:prstClr val="black"/>
+                    </a:solidFill>
+                  </a:rPr>
+                  <a:t>, bias towards nodes close to node t, BFS behavior.</a:t>
+                </a:r>
+              </a:p>
+              <a:p>
+                <a:pPr lvl="1"/>
+                <a14:m>
+                  <m:oMath xmlns:m="http://schemas.openxmlformats.org/officeDocument/2006/math">
+                    <m:r>
+                      <a:rPr lang="en-US" altLang="zh-CN" sz="2400" i="1">
+                        <a:solidFill>
+                          <a:prstClr val="black"/>
+                        </a:solidFill>
+                        <a:latin typeface="Cambria Math" panose="02040503050406030204" pitchFamily="18" charset="0"/>
+                      </a:rPr>
+                      <m:t>𝑞</m:t>
+                    </m:r>
+                    <m:r>
+                      <a:rPr lang="en-US" altLang="zh-CN" sz="2400" b="0" i="1" smtClean="0">
+                        <a:solidFill>
+                          <a:prstClr val="black"/>
+                        </a:solidFill>
+                        <a:latin typeface="Cambria Math" panose="02040503050406030204" pitchFamily="18" charset="0"/>
+                      </a:rPr>
+                      <m:t>&lt;</m:t>
+                    </m:r>
+                    <m:r>
+                      <a:rPr lang="en-US" altLang="zh-CN" sz="2400" i="1">
+                        <a:solidFill>
+                          <a:prstClr val="black"/>
+                        </a:solidFill>
+                        <a:latin typeface="Cambria Math" panose="02040503050406030204" pitchFamily="18" charset="0"/>
+                      </a:rPr>
+                      <m:t>1</m:t>
+                    </m:r>
+                  </m:oMath>
+                </a14:m>
+                <a:r>
+                  <a:rPr lang="en-US" altLang="zh-CN" sz="2400" dirty="0">
+                    <a:solidFill>
+                      <a:prstClr val="black"/>
+                    </a:solidFill>
+                  </a:rPr>
+                  <a:t>, bias towards nodes far away from node t, DFS behavior.</a:t>
+                </a:r>
+              </a:p>
+            </p:txBody>
+          </p:sp>
+        </mc:Choice>
+        <mc:Fallback>
+          <p:sp>
+            <p:nvSpPr>
+              <p:cNvPr id="7" name="矩形 6">
+                <a:extLst>
+                  <a:ext uri="{FF2B5EF4-FFF2-40B4-BE49-F238E27FC236}">
+                    <a16:creationId xmlns:a16="http://schemas.microsoft.com/office/drawing/2014/main" id="{5ADE71BA-50FE-47DA-93BD-C3EECAD4A5C1}"/>
+                  </a:ext>
+                </a:extLst>
+              </p:cNvPr>
+              <p:cNvSpPr>
+                <a:spLocks noRot="1" noChangeAspect="1" noMove="1" noResize="1" noEditPoints="1" noAdjustHandles="1" noChangeArrowheads="1" noChangeShapeType="1" noTextEdit="1"/>
+              </p:cNvSpPr>
+              <p:nvPr/>
+            </p:nvSpPr>
+            <p:spPr>
+              <a:xfrm>
+                <a:off x="135753" y="443017"/>
+                <a:ext cx="11848550" cy="3046988"/>
+              </a:xfrm>
+              <a:prstGeom prst="rect">
+                <a:avLst/>
+              </a:prstGeom>
+              <a:blipFill>
+                <a:blip r:embed="rId5"/>
+                <a:stretch>
+                  <a:fillRect l="-669" t="-1600" b="-3600"/>
+                </a:stretch>
+              </a:blipFill>
+            </p:spPr>
+            <p:txBody>
+              <a:bodyPr/>
+              <a:lstStyle/>
+              <a:p>
+                <a:r>
+                  <a:rPr lang="zh-CN" altLang="en-US">
+                    <a:noFill/>
+                  </a:rPr>
+                  <a:t> </a:t>
+                </a:r>
+              </a:p>
+            </p:txBody>
+          </p:sp>
+        </mc:Fallback>
+      </mc:AlternateContent>
+      <p:sp>
+        <p:nvSpPr>
+          <p:cNvPr id="9" name="矩形 8">
+            <a:extLst>
+              <a:ext uri="{FF2B5EF4-FFF2-40B4-BE49-F238E27FC236}">
+                <a16:creationId xmlns:a16="http://schemas.microsoft.com/office/drawing/2014/main" id="{40499CCD-0991-4677-87AA-DF4AD996BBA1}"/>
+              </a:ext>
+            </a:extLst>
+          </p:cNvPr>
+          <p:cNvSpPr/>
+          <p:nvPr/>
+        </p:nvSpPr>
+        <p:spPr>
+          <a:xfrm>
+            <a:off x="659731" y="3912543"/>
+            <a:ext cx="7503080" cy="461665"/>
+          </a:xfrm>
+          <a:prstGeom prst="rect">
+            <a:avLst/>
+          </a:prstGeom>
+        </p:spPr>
+        <p:txBody>
+          <a:bodyPr wrap="none">
+            <a:spAutoFit/>
+          </a:bodyPr>
+          <a:lstStyle/>
+          <a:p>
+            <a:r>
+              <a:rPr lang="en-US" altLang="zh-CN" sz="2400" dirty="0">
+                <a:solidFill>
+                  <a:prstClr val="black"/>
+                </a:solidFill>
+              </a:rPr>
+              <a:t>node2vec is not tied to a particular notion of equivalence. </a:t>
+            </a:r>
+            <a:endParaRPr lang="zh-CN" altLang="en-US" dirty="0"/>
+          </a:p>
+        </p:txBody>
+      </p:sp>
+    </p:spTree>
+    <p:extLst>
+      <p:ext uri="{BB962C8B-B14F-4D97-AF65-F5344CB8AC3E}">
+        <p14:creationId xmlns:p14="http://schemas.microsoft.com/office/powerpoint/2010/main" val="1419941339"/>
+      </p:ext>
+    </p:extLst>
+  </p:cSld>
+  <p:clrMapOvr>
+    <a:masterClrMapping/>
+  </p:clrMapOvr>
+</p:sld>
+</file>
+
 <file path=ppt/theme/theme1.xml><?xml version="1.0" encoding="utf-8"?>
 <a:theme xmlns:a="http://schemas.openxmlformats.org/drawingml/2006/main" name="Office 主题​​">
   <a:themeElements>

</xml_diff>